<commit_message>
Modify md file in WWW
</commit_message>
<xml_diff>
--- a/subjects/WWW/Bazy danych - 2 zajęcia.pptx
+++ b/subjects/WWW/Bazy danych - 2 zajęcia.pptx
@@ -5,7 +5,7 @@
     <p:sldMasterId id="2147483720" r:id="rId1"/>
   </p:sldMasterIdLst>
   <p:notesMasterIdLst>
-    <p:notesMasterId r:id="rId19"/>
+    <p:notesMasterId r:id="rId18"/>
   </p:notesMasterIdLst>
   <p:sldIdLst>
     <p:sldId id="381" r:id="rId2"/>
@@ -24,7 +24,6 @@
     <p:sldId id="379" r:id="rId15"/>
     <p:sldId id="380" r:id="rId16"/>
     <p:sldId id="373" r:id="rId17"/>
-    <p:sldId id="372" r:id="rId18"/>
   </p:sldIdLst>
   <p:sldSz cx="12192000" cy="6858000"/>
   <p:notesSz cx="6858000" cy="9144000"/>
@@ -129,6 +128,14 @@
     </p:ext>
   </p:extLst>
 </p:presentation>
+</file>
+
+<file path=ppt/revisionInfo.xml><?xml version="1.0" encoding="utf-8"?>
+<p1510:revInfo xmlns:a="http://schemas.openxmlformats.org/drawingml/2006/main" xmlns:r="http://schemas.openxmlformats.org/officeDocument/2006/relationships" xmlns:p1510="http://schemas.microsoft.com/office/powerpoint/2015/10/main">
+  <p1510:revLst>
+    <p1510:client id="{5A533EE0-532D-4D5B-9C18-E55E46EF6896}" v="1" dt="2024-03-04T08:53:48.585"/>
+  </p1510:revLst>
+</p1510:revInfo>
 </file>
 
 <file path=ppt/changesInfos/changesInfo1.xml><?xml version="1.0" encoding="utf-8"?>
@@ -483,6 +490,37 @@
     </pc:docChg>
   </pc:docChgLst>
   <pc:docChgLst>
+    <pc:chgData name="Serafin Patryk" userId="ce8cf8d3-b140-43f7-9541-10745587815e" providerId="ADAL" clId="{5A533EE0-532D-4D5B-9C18-E55E46EF6896}"/>
+    <pc:docChg chg="delSld modSld">
+      <pc:chgData name="Serafin Patryk" userId="ce8cf8d3-b140-43f7-9541-10745587815e" providerId="ADAL" clId="{5A533EE0-532D-4D5B-9C18-E55E46EF6896}" dt="2024-03-04T08:54:00.802" v="1" actId="47"/>
+      <pc:docMkLst>
+        <pc:docMk/>
+      </pc:docMkLst>
+      <pc:sldChg chg="del">
+        <pc:chgData name="Serafin Patryk" userId="ce8cf8d3-b140-43f7-9541-10745587815e" providerId="ADAL" clId="{5A533EE0-532D-4D5B-9C18-E55E46EF6896}" dt="2024-03-04T08:54:00.802" v="1" actId="47"/>
+        <pc:sldMkLst>
+          <pc:docMk/>
+          <pc:sldMk cId="1140178177" sldId="372"/>
+        </pc:sldMkLst>
+      </pc:sldChg>
+      <pc:sldChg chg="modSp">
+        <pc:chgData name="Serafin Patryk" userId="ce8cf8d3-b140-43f7-9541-10745587815e" providerId="ADAL" clId="{5A533EE0-532D-4D5B-9C18-E55E46EF6896}" dt="2024-03-04T08:53:48.585" v="0"/>
+        <pc:sldMkLst>
+          <pc:docMk/>
+          <pc:sldMk cId="3265729095" sldId="380"/>
+        </pc:sldMkLst>
+        <pc:graphicFrameChg chg="mod">
+          <ac:chgData name="Serafin Patryk" userId="ce8cf8d3-b140-43f7-9541-10745587815e" providerId="ADAL" clId="{5A533EE0-532D-4D5B-9C18-E55E46EF6896}" dt="2024-03-04T08:53:48.585" v="0"/>
+          <ac:graphicFrameMkLst>
+            <pc:docMk/>
+            <pc:sldMk cId="3265729095" sldId="380"/>
+            <ac:graphicFrameMk id="5" creationId="{38AFD5B6-14B2-5406-7B58-8ECF49A7F922}"/>
+          </ac:graphicFrameMkLst>
+        </pc:graphicFrameChg>
+      </pc:sldChg>
+    </pc:docChg>
+  </pc:docChgLst>
+  <pc:docChgLst>
     <pc:chgData name="Patryk Serafin" userId="86fa742248e137ce" providerId="LiveId" clId="{3298C733-EA56-44BD-B82F-19114443C032}"/>
     <pc:docChg chg="undo redo custSel addSld delSld modSld sldOrd addMainMaster delMainMaster">
       <pc:chgData name="Patryk Serafin" userId="86fa742248e137ce" providerId="LiveId" clId="{3298C733-EA56-44BD-B82F-19114443C032}" dt="2024-01-30T22:43:19.667" v="3909" actId="20577"/>
@@ -5536,7 +5574,7 @@
           <a:p>
             <a:fld id="{648B3C1D-5755-4177-931D-38D740BDF3D2}" type="datetimeFigureOut">
               <a:rPr lang="pl-PL" smtClean="0"/>
-              <a:t>04.02.2024</a:t>
+              <a:t>04.03.2024</a:t>
             </a:fld>
             <a:endParaRPr lang="pl-PL"/>
           </a:p>
@@ -5956,7 +5994,7 @@
           <a:p>
             <a:fld id="{999A8DD2-C443-44AD-85B3-4CE72B962C5F}" type="datetimeFigureOut">
               <a:rPr lang="en-US" smtClean="0"/>
-              <a:t>2/4/2024</a:t>
+              <a:t>3/4/2024</a:t>
             </a:fld>
             <a:endParaRPr lang="en-US"/>
           </a:p>
@@ -6164,7 +6202,7 @@
           <a:p>
             <a:fld id="{999A8DD2-C443-44AD-85B3-4CE72B962C5F}" type="datetimeFigureOut">
               <a:rPr lang="en-US" smtClean="0"/>
-              <a:t>2/4/2024</a:t>
+              <a:t>3/4/2024</a:t>
             </a:fld>
             <a:endParaRPr lang="en-US"/>
           </a:p>
@@ -6372,7 +6410,7 @@
           <a:p>
             <a:fld id="{999A8DD2-C443-44AD-85B3-4CE72B962C5F}" type="datetimeFigureOut">
               <a:rPr lang="en-US" smtClean="0"/>
-              <a:t>2/4/2024</a:t>
+              <a:t>3/4/2024</a:t>
             </a:fld>
             <a:endParaRPr lang="en-US"/>
           </a:p>
@@ -6570,7 +6608,7 @@
           <a:p>
             <a:fld id="{999A8DD2-C443-44AD-85B3-4CE72B962C5F}" type="datetimeFigureOut">
               <a:rPr lang="en-US" smtClean="0"/>
-              <a:t>2/4/2024</a:t>
+              <a:t>3/4/2024</a:t>
             </a:fld>
             <a:endParaRPr lang="en-US"/>
           </a:p>
@@ -6848,7 +6886,7 @@
           <a:p>
             <a:fld id="{999A8DD2-C443-44AD-85B3-4CE72B962C5F}" type="datetimeFigureOut">
               <a:rPr lang="en-US" smtClean="0"/>
-              <a:t>2/4/2024</a:t>
+              <a:t>3/4/2024</a:t>
             </a:fld>
             <a:endParaRPr lang="en-US"/>
           </a:p>
@@ -7120,7 +7158,7 @@
           <a:p>
             <a:fld id="{999A8DD2-C443-44AD-85B3-4CE72B962C5F}" type="datetimeFigureOut">
               <a:rPr lang="en-US" smtClean="0"/>
-              <a:t>2/4/2024</a:t>
+              <a:t>3/4/2024</a:t>
             </a:fld>
             <a:endParaRPr lang="en-US"/>
           </a:p>
@@ -7544,7 +7582,7 @@
           <a:p>
             <a:fld id="{999A8DD2-C443-44AD-85B3-4CE72B962C5F}" type="datetimeFigureOut">
               <a:rPr lang="en-US" smtClean="0"/>
-              <a:t>2/4/2024</a:t>
+              <a:t>3/4/2024</a:t>
             </a:fld>
             <a:endParaRPr lang="en-US"/>
           </a:p>
@@ -7685,7 +7723,7 @@
           <a:p>
             <a:fld id="{999A8DD2-C443-44AD-85B3-4CE72B962C5F}" type="datetimeFigureOut">
               <a:rPr lang="en-US" smtClean="0"/>
-              <a:t>2/4/2024</a:t>
+              <a:t>3/4/2024</a:t>
             </a:fld>
             <a:endParaRPr lang="en-US"/>
           </a:p>
@@ -7798,7 +7836,7 @@
           <a:p>
             <a:fld id="{999A8DD2-C443-44AD-85B3-4CE72B962C5F}" type="datetimeFigureOut">
               <a:rPr lang="en-US" smtClean="0"/>
-              <a:t>2/4/2024</a:t>
+              <a:t>3/4/2024</a:t>
             </a:fld>
             <a:endParaRPr lang="en-US"/>
           </a:p>
@@ -8117,7 +8155,7 @@
           <a:p>
             <a:fld id="{999A8DD2-C443-44AD-85B3-4CE72B962C5F}" type="datetimeFigureOut">
               <a:rPr lang="en-US" smtClean="0"/>
-              <a:t>2/4/2024</a:t>
+              <a:t>3/4/2024</a:t>
             </a:fld>
             <a:endParaRPr lang="en-US"/>
           </a:p>
@@ -8411,7 +8449,7 @@
           <a:p>
             <a:fld id="{999A8DD2-C443-44AD-85B3-4CE72B962C5F}" type="datetimeFigureOut">
               <a:rPr lang="en-US" smtClean="0"/>
-              <a:t>2/4/2024</a:t>
+              <a:t>3/4/2024</a:t>
             </a:fld>
             <a:endParaRPr lang="en-US"/>
           </a:p>
@@ -8651,7 +8689,7 @@
           <a:p>
             <a:fld id="{999A8DD2-C443-44AD-85B3-4CE72B962C5F}" type="datetimeFigureOut">
               <a:rPr lang="en-US" smtClean="0"/>
-              <a:t>2/4/2024</a:t>
+              <a:t>3/4/2024</a:t>
             </a:fld>
             <a:endParaRPr lang="en-US"/>
           </a:p>
@@ -14072,7 +14110,7 @@
           <p:nvPr>
             <p:extLst>
               <p:ext uri="{D42A27DB-BD31-4B8C-83A1-F6EECF244321}">
-                <p14:modId xmlns:p14="http://schemas.microsoft.com/office/powerpoint/2010/main" val="4074942805"/>
+                <p14:modId xmlns:p14="http://schemas.microsoft.com/office/powerpoint/2010/main" val="852304618"/>
               </p:ext>
             </p:extLst>
           </p:nvPr>
@@ -14144,14 +14182,21 @@
                     <a:bodyPr/>
                     <a:lstStyle/>
                     <a:p>
-                      <a:pPr algn="ctr"/>
-                      <a:r>
-                        <a:rPr lang="pl-PL" sz="1500"/>
-                        <a:t>Rolki</a:t>
-                      </a:r>
-                    </a:p>
-                  </a:txBody>
-                  <a:tcPr marL="66439" marR="66439" marT="33220" marB="33220" anchor="ctr"/>
+                      <a:pPr marL="0" algn="ctr" defTabSz="914400" rtl="0" eaLnBrk="1" latinLnBrk="0" hangingPunct="1"/>
+                      <a:r>
+                        <a:rPr lang="pl-PL" sz="1400" kern="1200" dirty="0">
+                          <a:solidFill>
+                            <a:schemeClr val="dk1"/>
+                          </a:solidFill>
+                          <a:latin typeface="+mn-lt"/>
+                          <a:ea typeface="+mn-ea"/>
+                          <a:cs typeface="+mn-cs"/>
+                        </a:rPr>
+                        <a:t>Polska</a:t>
+                      </a:r>
+                    </a:p>
+                  </a:txBody>
+                  <a:tcPr marL="83686" marR="83686" marT="41843" marB="41843" anchor="ctr"/>
                 </a:tc>
                 <a:tc>
                   <a:txBody>
@@ -14179,14 +14224,21 @@
                     <a:bodyPr/>
                     <a:lstStyle/>
                     <a:p>
-                      <a:pPr algn="ctr"/>
-                      <a:r>
-                        <a:rPr lang="pl-PL" sz="1500"/>
-                        <a:t>Narty</a:t>
-                      </a:r>
-                    </a:p>
-                  </a:txBody>
-                  <a:tcPr marL="66439" marR="66439" marT="33220" marB="33220" anchor="ctr"/>
+                      <a:pPr marL="0" algn="ctr" defTabSz="914400" rtl="0" eaLnBrk="1" latinLnBrk="0" hangingPunct="1"/>
+                      <a:r>
+                        <a:rPr lang="pl-PL" sz="1400" kern="1200" dirty="0">
+                          <a:solidFill>
+                            <a:schemeClr val="dk1"/>
+                          </a:solidFill>
+                          <a:latin typeface="+mn-lt"/>
+                          <a:ea typeface="+mn-ea"/>
+                          <a:cs typeface="+mn-cs"/>
+                        </a:rPr>
+                        <a:t>Niemcy</a:t>
+                      </a:r>
+                    </a:p>
+                  </a:txBody>
+                  <a:tcPr marL="83686" marR="83686" marT="41843" marB="41843" anchor="ctr"/>
                 </a:tc>
                 <a:tc>
                   <a:txBody>
@@ -14920,161 +14972,6 @@
     <p:extLst>
       <p:ext uri="{BB962C8B-B14F-4D97-AF65-F5344CB8AC3E}">
         <p14:creationId xmlns:p14="http://schemas.microsoft.com/office/powerpoint/2010/main" val="1968622345"/>
-      </p:ext>
-    </p:extLst>
-  </p:cSld>
-  <p:clrMapOvr>
-    <a:masterClrMapping/>
-  </p:clrMapOvr>
-</p:sld>
-</file>
-
-<file path=ppt/slides/slide17.xml><?xml version="1.0" encoding="utf-8"?>
-<p:sld xmlns:a="http://schemas.openxmlformats.org/drawingml/2006/main" xmlns:r="http://schemas.openxmlformats.org/officeDocument/2006/relationships" xmlns:p="http://schemas.openxmlformats.org/presentationml/2006/main">
-  <p:cSld>
-    <p:spTree>
-      <p:nvGrpSpPr>
-        <p:cNvPr id="1" name=""/>
-        <p:cNvGrpSpPr/>
-        <p:nvPr/>
-      </p:nvGrpSpPr>
-      <p:grpSpPr>
-        <a:xfrm>
-          <a:off x="0" y="0"/>
-          <a:ext cx="0" cy="0"/>
-          <a:chOff x="0" y="0"/>
-          <a:chExt cx="0" cy="0"/>
-        </a:xfrm>
-      </p:grpSpPr>
-      <p:pic>
-        <p:nvPicPr>
-          <p:cNvPr id="4" name="Picture 3" descr="Okulary na wierzchu książki">
-            <a:extLst>
-              <a:ext uri="{FF2B5EF4-FFF2-40B4-BE49-F238E27FC236}">
-                <a16:creationId xmlns:a16="http://schemas.microsoft.com/office/drawing/2014/main" id="{B6B93A28-5D41-43C6-B15E-E06B4CC5DA95}"/>
-              </a:ext>
-            </a:extLst>
-          </p:cNvPr>
-          <p:cNvPicPr>
-            <a:picLocks noChangeAspect="1"/>
-          </p:cNvPicPr>
-          <p:nvPr/>
-        </p:nvPicPr>
-        <p:blipFill rotWithShape="1">
-          <a:blip r:embed="rId2"/>
-          <a:srcRect t="14112" b="983"/>
-          <a:stretch/>
-        </p:blipFill>
-        <p:spPr>
-          <a:xfrm>
-            <a:off x="20" y="-1"/>
-            <a:ext cx="12191980" cy="6858001"/>
-          </a:xfrm>
-          <a:prstGeom prst="rect">
-            <a:avLst/>
-          </a:prstGeom>
-        </p:spPr>
-      </p:pic>
-      <p:sp>
-        <p:nvSpPr>
-          <p:cNvPr id="2" name="Tytuł 1">
-            <a:extLst>
-              <a:ext uri="{FF2B5EF4-FFF2-40B4-BE49-F238E27FC236}">
-                <a16:creationId xmlns:a16="http://schemas.microsoft.com/office/drawing/2014/main" id="{DD9B76F6-7E88-5471-4064-6AFC2D6CC2E8}"/>
-              </a:ext>
-            </a:extLst>
-          </p:cNvPr>
-          <p:cNvSpPr>
-            <a:spLocks noGrp="1"/>
-          </p:cNvSpPr>
-          <p:nvPr>
-            <p:ph type="title"/>
-          </p:nvPr>
-        </p:nvSpPr>
-        <p:spPr>
-          <a:xfrm>
-            <a:off x="626918" y="3429000"/>
-            <a:ext cx="4506064" cy="1888742"/>
-          </a:xfrm>
-        </p:spPr>
-        <p:txBody>
-          <a:bodyPr vert="horz" lIns="91440" tIns="45720" rIns="91440" bIns="45720" rtlCol="0" anchor="b">
-            <a:normAutofit/>
-          </a:bodyPr>
-          <a:lstStyle/>
-          <a:p>
-            <a:r>
-              <a:rPr lang="en-US" sz="4000" dirty="0" err="1">
-                <a:solidFill>
-                  <a:schemeClr val="bg1"/>
-                </a:solidFill>
-                <a:hlinkClick r:id="rId3">
-                  <a:extLst>
-                    <a:ext uri="{A12FA001-AC4F-418D-AE19-62706E023703}">
-                      <ahyp:hlinkClr xmlns:ahyp="http://schemas.microsoft.com/office/drawing/2018/hyperlinkcolor" val="tx"/>
-                    </a:ext>
-                  </a:extLst>
-                </a:hlinkClick>
-              </a:rPr>
-              <a:t>Sprawdź</a:t>
-            </a:r>
-            <a:r>
-              <a:rPr lang="en-US" sz="4000" dirty="0">
-                <a:solidFill>
-                  <a:schemeClr val="bg1"/>
-                </a:solidFill>
-                <a:hlinkClick r:id="rId3">
-                  <a:extLst>
-                    <a:ext uri="{A12FA001-AC4F-418D-AE19-62706E023703}">
-                      <ahyp:hlinkClr xmlns:ahyp="http://schemas.microsoft.com/office/drawing/2018/hyperlinkcolor" val="tx"/>
-                    </a:ext>
-                  </a:extLst>
-                </a:hlinkClick>
-              </a:rPr>
-              <a:t> </a:t>
-            </a:r>
-            <a:r>
-              <a:rPr lang="en-US" sz="4000" dirty="0" err="1">
-                <a:solidFill>
-                  <a:schemeClr val="bg1"/>
-                </a:solidFill>
-                <a:hlinkClick r:id="rId3">
-                  <a:extLst>
-                    <a:ext uri="{A12FA001-AC4F-418D-AE19-62706E023703}">
-                      <ahyp:hlinkClr xmlns:ahyp="http://schemas.microsoft.com/office/drawing/2018/hyperlinkcolor" val="tx"/>
-                    </a:ext>
-                  </a:extLst>
-                </a:hlinkClick>
-              </a:rPr>
-              <a:t>siebie</a:t>
-            </a:r>
-            <a:r>
-              <a:rPr lang="en-US" sz="4000" dirty="0">
-                <a:solidFill>
-                  <a:schemeClr val="bg1"/>
-                </a:solidFill>
-                <a:hlinkClick r:id="rId3">
-                  <a:extLst>
-                    <a:ext uri="{A12FA001-AC4F-418D-AE19-62706E023703}">
-                      <ahyp:hlinkClr xmlns:ahyp="http://schemas.microsoft.com/office/drawing/2018/hyperlinkcolor" val="tx"/>
-                    </a:ext>
-                  </a:extLst>
-                </a:hlinkClick>
-              </a:rPr>
-              <a:t>!</a:t>
-            </a:r>
-            <a:endParaRPr lang="en-US" sz="4000" dirty="0">
-              <a:solidFill>
-                <a:schemeClr val="bg1"/>
-              </a:solidFill>
-            </a:endParaRPr>
-          </a:p>
-        </p:txBody>
-      </p:sp>
-    </p:spTree>
-    <p:extLst>
-      <p:ext uri="{BB962C8B-B14F-4D97-AF65-F5344CB8AC3E}">
-        <p14:creationId xmlns:p14="http://schemas.microsoft.com/office/powerpoint/2010/main" val="1140178177"/>
       </p:ext>
     </p:extLst>
   </p:cSld>

</xml_diff>